<commit_message>
Fix some nits in the sample JSON response data that Stéphane saw.
Also, add a bullet item for removing stale data from the database.
</commit_message>
<xml_diff>
--- a/doc/slides/GEC21/monitoring-meeting-gec21.pptx
+++ b/doc/slides/GEC21/monitoring-meeting-gec21.pptx
@@ -3841,15 +3841,7 @@
             <a:pPr algn="r"/>
             <a:r>
               <a:rPr lang="en-US" dirty="0" smtClean="0"/>
-              <a:t>GEC21, </a:t>
-            </a:r>
-            <a:r>
-              <a:rPr lang="en-US" dirty="0" smtClean="0"/>
-              <a:t>October </a:t>
-            </a:r>
-            <a:r>
-              <a:rPr lang="en-US" dirty="0" smtClean="0"/>
-              <a:t>22, 2014</a:t>
+              <a:t>GEC21, October 22, 2014</a:t>
             </a:r>
           </a:p>
           <a:p>
@@ -3866,7 +3858,6 @@
               <a:rPr lang="en-US" sz="1600" dirty="0" smtClean="0"/>
               <a:t>t the GPO Office, Hoosier Room, IMU Main Level, 4-5:30 PM</a:t>
             </a:r>
-            <a:endParaRPr lang="en-US" sz="1600" dirty="0" smtClean="0"/>
           </a:p>
         </p:txBody>
       </p:sp>
@@ -3924,15 +3915,7 @@
           <a:p>
             <a:r>
               <a:rPr lang="en-US" sz="2800" dirty="0" smtClean="0"/>
-              <a:t>JSON data response: </a:t>
-            </a:r>
-            <a:r>
-              <a:rPr lang="en-US" sz="2800" dirty="0" smtClean="0"/>
-              <a:t>id </a:t>
-            </a:r>
-            <a:r>
-              <a:rPr lang="en-US" sz="2800" dirty="0" smtClean="0"/>
-              <a:t>field</a:t>
+              <a:t>JSON data response: id field</a:t>
             </a:r>
             <a:endParaRPr lang="en-US" sz="2800" dirty="0"/>
           </a:p>
@@ -3947,7 +3930,7 @@
         <p:spPr>
           <a:xfrm>
             <a:off x="445218" y="1219200"/>
-            <a:ext cx="6739144" cy="3108544"/>
+            <a:ext cx="7514497" cy="3139321"/>
           </a:xfrm>
           <a:prstGeom prst="rect">
             <a:avLst/>
@@ -3976,15 +3959,7 @@
                   <a:srgbClr val="000000"/>
                 </a:solidFill>
               </a:rPr>
-              <a:t> </a:t>
-            </a:r>
-            <a:r>
-              <a:rPr lang="en-US" sz="1400" dirty="0" smtClean="0">
-                <a:solidFill>
-                  <a:srgbClr val="000000"/>
-                </a:solidFill>
-              </a:rPr>
-              <a:t>{</a:t>
+              <a:t> {</a:t>
             </a:r>
             <a:r>
               <a:rPr lang="en-US" sz="1400" dirty="0">
@@ -4183,7 +4158,7 @@
                 </a:solidFill>
                 <a:hlinkClick r:id="rId2"/>
               </a:rPr>
-              <a:t>/ion.internet2</a:t>
+              <a:t>/</a:t>
             </a:r>
             <a:r>
               <a:rPr lang="en-US" sz="1400" dirty="0">
@@ -4192,6 +4167,24 @@
                 </a:solidFill>
                 <a:hlinkClick r:id="rId2"/>
               </a:rPr>
+              <a:t>rtr.wash.</a:t>
+            </a:r>
+            <a:r>
+              <a:rPr lang="en-US" sz="1400" dirty="0" smtClean="0">
+                <a:solidFill>
+                  <a:srgbClr val="000000"/>
+                </a:solidFill>
+                <a:hlinkClick r:id="rId2"/>
+              </a:rPr>
+              <a:t>ion.internet2</a:t>
+            </a:r>
+            <a:r>
+              <a:rPr lang="en-US" sz="1400" dirty="0">
+                <a:solidFill>
+                  <a:srgbClr val="000000"/>
+                </a:solidFill>
+                <a:hlinkClick r:id="rId2"/>
+              </a:rPr>
               <a:t>.edu/xe-0/2/</a:t>
             </a:r>
             <a:r>
@@ -4211,11 +4204,6 @@
               </a:rPr>
               <a:t>”</a:t>
             </a:r>
-            <a:endParaRPr lang="en-US" sz="1400" dirty="0" smtClean="0">
-              <a:solidFill>
-                <a:srgbClr val="000000"/>
-              </a:solidFill>
-            </a:endParaRPr>
           </a:p>
           <a:p>
             <a:r>
@@ -4235,7 +4223,7 @@
               <a:t>id":"</a:t>
             </a:r>
             <a:r>
-              <a:rPr lang="en-US" sz="1400" dirty="0">
+              <a:rPr lang="en-US" sz="1400" dirty="0" smtClean="0">
                 <a:solidFill>
                   <a:srgbClr val="FF0000"/>
                 </a:solidFill>
@@ -4243,12 +4231,20 @@
               <a:t>rx_bps:</a:t>
             </a:r>
             <a:r>
-              <a:rPr lang="en-US" sz="1400" dirty="0">
-                <a:solidFill>
-                  <a:srgbClr val="000000"/>
-                </a:solidFill>
-              </a:rPr>
-              <a:t>ion.internet2.edu+interface+rtr.wash.ion.internet2.edu:xe-0/2/2"</a:t>
+              <a:rPr lang="en-US" sz="1400" dirty="0" smtClean="0">
+                <a:solidFill>
+                  <a:srgbClr val="000000"/>
+                </a:solidFill>
+              </a:rPr>
+              <a:t>rtr.wash.ion.internet2</a:t>
+            </a:r>
+            <a:r>
+              <a:rPr lang="en-US" sz="1400" dirty="0">
+                <a:solidFill>
+                  <a:srgbClr val="000000"/>
+                </a:solidFill>
+              </a:rPr>
+              <a:t>.edu:xe-0/2/2"</a:t>
             </a:r>
             <a:r>
               <a:rPr lang="en-US" sz="1400" dirty="0" smtClean="0">
@@ -4335,33 +4331,24 @@
                 </a:solidFill>
                 <a:hlinkClick r:id="rId3"/>
               </a:rPr>
-              <a:t>“http</a:t>
-            </a:r>
-            <a:r>
-              <a:rPr lang="en-US" sz="1400" dirty="0" smtClean="0">
+              <a:t>“http:</a:t>
+            </a:r>
+            <a:r>
+              <a:rPr lang="en-US" sz="1400" dirty="0">
                 <a:solidFill>
                   <a:srgbClr val="000000"/>
                 </a:solidFill>
                 <a:hlinkClick r:id="rId3"/>
               </a:rPr>
-              <a:t>:</a:t>
-            </a:r>
-            <a:r>
-              <a:rPr lang="en-US" sz="1400" dirty="0">
+              <a:t>//www.gpolab.bbn.com/monitoring/schema/20140828/data</a:t>
+            </a:r>
+            <a:r>
+              <a:rPr lang="en-US" sz="1400" dirty="0" smtClean="0">
                 <a:solidFill>
                   <a:srgbClr val="000000"/>
                 </a:solidFill>
                 <a:hlinkClick r:id="rId3"/>
               </a:rPr>
-              <a:t>//www.gpolab.bbn.com/monitoring/schema/20140828/data</a:t>
-            </a:r>
-            <a:r>
-              <a:rPr lang="en-US" sz="1400" dirty="0" smtClean="0">
-                <a:solidFill>
-                  <a:srgbClr val="000000"/>
-                </a:solidFill>
-                <a:hlinkClick r:id="rId3"/>
-              </a:rPr>
               <a:t>#</a:t>
             </a:r>
             <a:r>
@@ -4372,28 +4359,15 @@
               </a:rPr>
               <a:t>”</a:t>
             </a:r>
-            <a:endParaRPr lang="en-US" sz="1400" dirty="0" smtClean="0">
-              <a:solidFill>
-                <a:srgbClr val="000000"/>
-              </a:solidFill>
-            </a:endParaRPr>
-          </a:p>
-          <a:p>
-            <a:r>
-              <a:rPr lang="en-US" sz="1400" dirty="0" smtClean="0">
-                <a:solidFill>
-                  <a:srgbClr val="000000"/>
-                </a:solidFill>
-              </a:rPr>
-              <a:t>  }</a:t>
-            </a:r>
-            <a:r>
-              <a:rPr lang="en-US" sz="1400" dirty="0" smtClean="0">
-                <a:solidFill>
-                  <a:srgbClr val="000000"/>
-                </a:solidFill>
-              </a:rPr>
-              <a:t>,</a:t>
+          </a:p>
+          <a:p>
+            <a:r>
+              <a:rPr lang="en-US" sz="1400" dirty="0" smtClean="0">
+                <a:solidFill>
+                  <a:srgbClr val="000000"/>
+                </a:solidFill>
+              </a:rPr>
+              <a:t>  },</a:t>
             </a:r>
           </a:p>
           <a:p>
@@ -4570,15 +4544,7 @@
           <a:p>
             <a:r>
               <a:rPr lang="en-US" sz="2800" dirty="0" smtClean="0"/>
-              <a:t>JSON data response: $schema</a:t>
-            </a:r>
-            <a:r>
-              <a:rPr lang="en-US" sz="2800" dirty="0" smtClean="0"/>
-              <a:t> </a:t>
-            </a:r>
-            <a:r>
-              <a:rPr lang="en-US" sz="2800" dirty="0" smtClean="0"/>
-              <a:t>field</a:t>
+              <a:t>JSON data response: $schema field</a:t>
             </a:r>
             <a:endParaRPr lang="en-US" sz="2800" dirty="0"/>
           </a:p>
@@ -4593,7 +4559,7 @@
         <p:spPr>
           <a:xfrm>
             <a:off x="445218" y="1219200"/>
-            <a:ext cx="6739144" cy="3108544"/>
+            <a:ext cx="7514497" cy="3139321"/>
           </a:xfrm>
           <a:prstGeom prst="rect">
             <a:avLst/>
@@ -4622,15 +4588,7 @@
                   <a:srgbClr val="000000"/>
                 </a:solidFill>
               </a:rPr>
-              <a:t> </a:t>
-            </a:r>
-            <a:r>
-              <a:rPr lang="en-US" sz="1400" dirty="0" smtClean="0">
-                <a:solidFill>
-                  <a:srgbClr val="000000"/>
-                </a:solidFill>
-              </a:rPr>
-              <a:t>{</a:t>
+              <a:t> {</a:t>
             </a:r>
             <a:r>
               <a:rPr lang="en-US" sz="1400" dirty="0">
@@ -4829,7 +4787,7 @@
                 </a:solidFill>
                 <a:hlinkClick r:id="rId2"/>
               </a:rPr>
-              <a:t>/ion.internet2</a:t>
+              <a:t>/</a:t>
             </a:r>
             <a:r>
               <a:rPr lang="en-US" sz="1400" dirty="0">
@@ -4838,6 +4796,24 @@
                 </a:solidFill>
                 <a:hlinkClick r:id="rId2"/>
               </a:rPr>
+              <a:t>rtr.wash.</a:t>
+            </a:r>
+            <a:r>
+              <a:rPr lang="en-US" sz="1400" dirty="0" smtClean="0">
+                <a:solidFill>
+                  <a:srgbClr val="000000"/>
+                </a:solidFill>
+                <a:hlinkClick r:id="rId2"/>
+              </a:rPr>
+              <a:t>ion.internet2</a:t>
+            </a:r>
+            <a:r>
+              <a:rPr lang="en-US" sz="1400" dirty="0">
+                <a:solidFill>
+                  <a:srgbClr val="000000"/>
+                </a:solidFill>
+                <a:hlinkClick r:id="rId2"/>
+              </a:rPr>
               <a:t>.edu/xe-0/2/</a:t>
             </a:r>
             <a:r>
@@ -4857,11 +4833,6 @@
               </a:rPr>
               <a:t>”</a:t>
             </a:r>
-            <a:endParaRPr lang="en-US" sz="1400" dirty="0" smtClean="0">
-              <a:solidFill>
-                <a:srgbClr val="000000"/>
-              </a:solidFill>
-            </a:endParaRPr>
           </a:p>
           <a:p>
             <a:r>
@@ -4878,7 +4849,23 @@
                   <a:srgbClr val="000000"/>
                 </a:solidFill>
               </a:rPr>
-              <a:t>id":"rx_bps:ion.internet2.edu+interface+rtr.wash.ion.internet2.edu:xe-0/2/2"</a:t>
+              <a:t>id":"</a:t>
+            </a:r>
+            <a:r>
+              <a:rPr lang="en-US" sz="1400" dirty="0" smtClean="0">
+                <a:solidFill>
+                  <a:srgbClr val="000000"/>
+                </a:solidFill>
+              </a:rPr>
+              <a:t>rx_bps:rtr.wash.ion.internet2</a:t>
+            </a:r>
+            <a:r>
+              <a:rPr lang="en-US" sz="1400" dirty="0">
+                <a:solidFill>
+                  <a:srgbClr val="000000"/>
+                </a:solidFill>
+              </a:rPr>
+              <a:t>.edu:xe-0/2/2"</a:t>
             </a:r>
             <a:r>
               <a:rPr lang="en-US" sz="1400" dirty="0" smtClean="0">
@@ -4981,33 +4968,24 @@
                 </a:solidFill>
                 <a:hlinkClick r:id="rId3"/>
               </a:rPr>
-              <a:t>“http</a:t>
-            </a:r>
-            <a:r>
-              <a:rPr lang="en-US" sz="1400" dirty="0" smtClean="0">
+              <a:t>“http:</a:t>
+            </a:r>
+            <a:r>
+              <a:rPr lang="en-US" sz="1400" dirty="0">
                 <a:solidFill>
                   <a:srgbClr val="000000"/>
                 </a:solidFill>
                 <a:hlinkClick r:id="rId3"/>
               </a:rPr>
-              <a:t>:</a:t>
-            </a:r>
-            <a:r>
-              <a:rPr lang="en-US" sz="1400" dirty="0">
+              <a:t>//www.gpolab.bbn.com/monitoring/schema/20140828/data</a:t>
+            </a:r>
+            <a:r>
+              <a:rPr lang="en-US" sz="1400" dirty="0" smtClean="0">
                 <a:solidFill>
                   <a:srgbClr val="000000"/>
                 </a:solidFill>
                 <a:hlinkClick r:id="rId3"/>
               </a:rPr>
-              <a:t>//www.gpolab.bbn.com/monitoring/schema/20140828/data</a:t>
-            </a:r>
-            <a:r>
-              <a:rPr lang="en-US" sz="1400" dirty="0" smtClean="0">
-                <a:solidFill>
-                  <a:srgbClr val="000000"/>
-                </a:solidFill>
-                <a:hlinkClick r:id="rId3"/>
-              </a:rPr>
               <a:t>#</a:t>
             </a:r>
             <a:r>
@@ -5018,28 +4996,15 @@
               </a:rPr>
               <a:t>”</a:t>
             </a:r>
-            <a:endParaRPr lang="en-US" sz="1400" dirty="0" smtClean="0">
-              <a:solidFill>
-                <a:srgbClr val="000000"/>
-              </a:solidFill>
-            </a:endParaRPr>
-          </a:p>
-          <a:p>
-            <a:r>
-              <a:rPr lang="en-US" sz="1400" dirty="0" smtClean="0">
-                <a:solidFill>
-                  <a:srgbClr val="000000"/>
-                </a:solidFill>
-              </a:rPr>
-              <a:t>  }</a:t>
-            </a:r>
-            <a:r>
-              <a:rPr lang="en-US" sz="1400" dirty="0" smtClean="0">
-                <a:solidFill>
-                  <a:srgbClr val="000000"/>
-                </a:solidFill>
-              </a:rPr>
-              <a:t>,</a:t>
+          </a:p>
+          <a:p>
+            <a:r>
+              <a:rPr lang="en-US" sz="1400" dirty="0" smtClean="0">
+                <a:solidFill>
+                  <a:srgbClr val="000000"/>
+                </a:solidFill>
+              </a:rPr>
+              <a:t>  },</a:t>
             </a:r>
           </a:p>
           <a:p>
@@ -5458,11 +5423,15 @@
             </a:r>
             <a:r>
               <a:rPr lang="en-US" dirty="0" smtClean="0"/>
-              <a:t>:”ion.internet2</a:t>
+              <a:t>:</a:t>
+            </a:r>
+            <a:r>
+              <a:rPr lang="en-US" dirty="0" smtClean="0"/>
+              <a:t>”rtr.wash.ion.internet2</a:t>
             </a:r>
             <a:r>
               <a:rPr lang="en-US" dirty="0"/>
-              <a:t>.edu+interface+rtr.wash.ion.internet2.edu:xe-0/2/2"</a:t>
+              <a:t>.edu:xe-0/2/2"</a:t>
             </a:r>
             <a:r>
               <a:rPr lang="en-US" dirty="0" smtClean="0"/>
@@ -5648,11 +5617,7 @@
             </a:pPr>
             <a:r>
               <a:rPr lang="en-US" sz="2000" dirty="0" smtClean="0"/>
-              <a:t>Bidirectional </a:t>
-            </a:r>
-            <a:r>
-              <a:rPr lang="en-US" sz="2000" dirty="0" smtClean="0"/>
-              <a:t>navigation</a:t>
+              <a:t>Bidirectional navigation</a:t>
             </a:r>
           </a:p>
           <a:p>
@@ -5672,11 +5637,7 @@
             </a:pPr>
             <a:r>
               <a:rPr lang="en-US" dirty="0" smtClean="0"/>
-              <a:t>Allows lightweight navigation of the monitoring data without needing to collect and store all of the data </a:t>
-            </a:r>
-            <a:r>
-              <a:rPr lang="en-US" dirty="0" smtClean="0"/>
-              <a:t>first</a:t>
+              <a:t>Allows lightweight navigation of the monitoring data without needing to collect and store all of the data first</a:t>
             </a:r>
           </a:p>
           <a:p>
@@ -5688,7 +5649,6 @@
               <a:rPr lang="en-US" dirty="0" smtClean="0"/>
               <a:t>This is a sweeping change that dwarfs any of the other JSON schema changes that have been discussed</a:t>
             </a:r>
-            <a:endParaRPr lang="en-US" dirty="0" smtClean="0"/>
           </a:p>
           <a:p>
             <a:pPr marL="742950" lvl="1" indent="-285750">
@@ -5740,11 +5700,7 @@
             </a:r>
             <a:r>
               <a:rPr lang="en-US" dirty="0" smtClean="0"/>
-              <a:t> supporting multiple </a:t>
-            </a:r>
-            <a:r>
-              <a:rPr lang="en-US" dirty="0" smtClean="0"/>
-              <a:t>aggregates</a:t>
+              <a:t> supporting multiple aggregates</a:t>
             </a:r>
           </a:p>
           <a:p>
@@ -5761,11 +5717,7 @@
             </a:pPr>
             <a:r>
               <a:rPr lang="en-US" sz="2000" dirty="0" smtClean="0"/>
-              <a:t>Objects could specify what measurements they </a:t>
-            </a:r>
-            <a:r>
-              <a:rPr lang="en-US" sz="2000" dirty="0" smtClean="0"/>
-              <a:t>support</a:t>
+              <a:t>Objects could specify what measurements they support</a:t>
             </a:r>
           </a:p>
           <a:p>
@@ -6175,6 +6127,15 @@
             <a:endParaRPr lang="en-US" dirty="0" smtClean="0"/>
           </a:p>
           <a:p>
+            <a:endParaRPr lang="en-US" dirty="0" smtClean="0"/>
+          </a:p>
+          <a:p>
+            <a:r>
+              <a:rPr lang="en-US" dirty="0" smtClean="0"/>
+              <a:t>Removing stale or obsolete data from the database</a:t>
+            </a:r>
+          </a:p>
+          <a:p>
             <a:endParaRPr lang="en-US" dirty="0"/>
           </a:p>
           <a:p>
@@ -6366,19 +6327,7 @@
           <a:p>
             <a:r>
               <a:rPr lang="en-US" dirty="0" smtClean="0"/>
-              <a:t>Possible </a:t>
-            </a:r>
-            <a:r>
-              <a:rPr lang="en-US" dirty="0" smtClean="0"/>
-              <a:t>Database</a:t>
-            </a:r>
-            <a:r>
-              <a:rPr lang="en-US" dirty="0" smtClean="0"/>
-              <a:t> </a:t>
-            </a:r>
-            <a:r>
-              <a:rPr lang="en-US" dirty="0" smtClean="0"/>
-              <a:t>Schema Changes</a:t>
+              <a:t>Possible Database Schema Changes</a:t>
             </a:r>
             <a:endParaRPr lang="en-US" dirty="0"/>
           </a:p>
@@ -6782,11 +6731,7 @@
           <a:p>
             <a:r>
               <a:rPr lang="en-US" dirty="0" smtClean="0"/>
-              <a:t>Using </a:t>
-            </a:r>
-            <a:r>
-              <a:rPr lang="en-US" dirty="0" smtClean="0"/>
-              <a:t>the </a:t>
+              <a:t>Using the </a:t>
             </a:r>
             <a:r>
               <a:rPr lang="en-US" dirty="0" err="1" smtClean="0"/>
@@ -6794,11 +6739,7 @@
             </a:r>
             <a:r>
               <a:rPr lang="en-US" dirty="0" smtClean="0"/>
-              <a:t> table as </a:t>
-            </a:r>
-            <a:r>
-              <a:rPr lang="en-US" dirty="0" smtClean="0"/>
-              <a:t>a representative example:</a:t>
+              <a:t> table as a representative example:</a:t>
             </a:r>
             <a:endParaRPr lang="en-US" dirty="0"/>
           </a:p>
@@ -6941,7 +6882,7 @@
         <p:spPr>
           <a:xfrm>
             <a:off x="445218" y="1219200"/>
-            <a:ext cx="8540056" cy="3970318"/>
+            <a:ext cx="8450851" cy="3600986"/>
           </a:xfrm>
           <a:prstGeom prst="rect">
             <a:avLst/>
@@ -6955,33 +6896,25 @@
           <a:lstStyle/>
           <a:p>
             <a:r>
-              <a:rPr lang="en-US" dirty="0" smtClean="0"/>
+              <a:rPr lang="en-US" sz="1600" dirty="0" smtClean="0"/>
               <a:t>[</a:t>
             </a:r>
           </a:p>
           <a:p>
             <a:r>
-              <a:rPr lang="en-US" dirty="0"/>
+              <a:rPr lang="en-US" sz="1600" dirty="0"/>
               <a:t> </a:t>
             </a:r>
             <a:r>
-              <a:rPr lang="en-US" dirty="0" smtClean="0">
-                <a:solidFill>
-                  <a:srgbClr val="000000"/>
-                </a:solidFill>
-              </a:rPr>
-              <a:t> </a:t>
-            </a:r>
-            <a:r>
-              <a:rPr lang="en-US" dirty="0" smtClean="0">
-                <a:solidFill>
-                  <a:srgbClr val="000000"/>
-                </a:solidFill>
-              </a:rPr>
-              <a:t>{</a:t>
-            </a:r>
-            <a:r>
-              <a:rPr lang="en-US" dirty="0">
+              <a:rPr lang="en-US" sz="1600" dirty="0" smtClean="0">
+                <a:solidFill>
+                  <a:srgbClr val="000000"/>
+                </a:solidFill>
+              </a:rPr>
+              <a:t> {</a:t>
+            </a:r>
+            <a:r>
+              <a:rPr lang="en-US" sz="1600" dirty="0">
                 <a:solidFill>
                   <a:srgbClr val="000000"/>
                 </a:solidFill>
@@ -6989,7 +6922,7 @@
               <a:t>"</a:t>
             </a:r>
             <a:r>
-              <a:rPr lang="en-US" dirty="0" err="1">
+              <a:rPr lang="en-US" sz="1600" dirty="0" err="1">
                 <a:solidFill>
                   <a:srgbClr val="000000"/>
                 </a:solidFill>
@@ -6997,7 +6930,7 @@
               <a:t>tsdata</a:t>
             </a:r>
             <a:r>
-              <a:rPr lang="en-US" dirty="0">
+              <a:rPr lang="en-US" sz="1600" dirty="0">
                 <a:solidFill>
                   <a:srgbClr val="000000"/>
                 </a:solidFill>
@@ -7007,7 +6940,7 @@
           </a:p>
           <a:p>
             <a:r>
-              <a:rPr lang="en-US" dirty="0">
+              <a:rPr lang="en-US" sz="1600" dirty="0">
                 <a:solidFill>
                   <a:srgbClr val="000000"/>
                 </a:solidFill>
@@ -7015,14 +6948,14 @@
               <a:t>        {"ts":1412124480000000,"v":7917}</a:t>
             </a:r>
             <a:r>
-              <a:rPr lang="en-US" dirty="0" smtClean="0">
+              <a:rPr lang="en-US" sz="1600" dirty="0" smtClean="0">
                 <a:solidFill>
                   <a:srgbClr val="000000"/>
                 </a:solidFill>
               </a:rPr>
               <a:t>,</a:t>
             </a:r>
-            <a:endParaRPr lang="en-US" dirty="0">
+            <a:endParaRPr lang="en-US" sz="1600" dirty="0">
               <a:solidFill>
                 <a:srgbClr val="000000"/>
               </a:solidFill>
@@ -7030,7 +6963,7 @@
           </a:p>
           <a:p>
             <a:r>
-              <a:rPr lang="en-US" dirty="0">
+              <a:rPr lang="en-US" sz="1600" dirty="0">
                 <a:solidFill>
                   <a:srgbClr val="000000"/>
                 </a:solidFill>
@@ -7040,7 +6973,7 @@
           </a:p>
           <a:p>
             <a:r>
-              <a:rPr lang="en-US" dirty="0">
+              <a:rPr lang="en-US" sz="1600" dirty="0">
                 <a:solidFill>
                   <a:srgbClr val="000000"/>
                 </a:solidFill>
@@ -7050,7 +6983,7 @@
           </a:p>
           <a:p>
             <a:r>
-              <a:rPr lang="en-US" dirty="0">
+              <a:rPr lang="en-US" sz="1600" dirty="0">
                 <a:solidFill>
                   <a:srgbClr val="000000"/>
                 </a:solidFill>
@@ -7058,7 +6991,7 @@
               <a:t>    "</a:t>
             </a:r>
             <a:r>
-              <a:rPr lang="en-US" dirty="0" err="1">
+              <a:rPr lang="en-US" sz="1600" dirty="0" err="1">
                 <a:solidFill>
                   <a:srgbClr val="000000"/>
                 </a:solidFill>
@@ -7066,7 +6999,7 @@
               <a:t>eventType</a:t>
             </a:r>
             <a:r>
-              <a:rPr lang="en-US" dirty="0">
+              <a:rPr lang="en-US" sz="1600" dirty="0">
                 <a:solidFill>
                   <a:srgbClr val="000000"/>
                 </a:solidFill>
@@ -7074,7 +7007,7 @@
               <a:t>":"</a:t>
             </a:r>
             <a:r>
-              <a:rPr lang="en-US" dirty="0" err="1" smtClean="0">
+              <a:rPr lang="en-US" sz="1600" dirty="0" err="1" smtClean="0">
                 <a:solidFill>
                   <a:srgbClr val="000000"/>
                 </a:solidFill>
@@ -7082,14 +7015,14 @@
               <a:t>ops_monitoring:rx_bps</a:t>
             </a:r>
             <a:r>
-              <a:rPr lang="en-US" dirty="0" smtClean="0">
+              <a:rPr lang="en-US" sz="1600" dirty="0" smtClean="0">
                 <a:solidFill>
                   <a:srgbClr val="000000"/>
                 </a:solidFill>
               </a:rPr>
               <a:t>”,</a:t>
             </a:r>
-            <a:endParaRPr lang="en-US" dirty="0">
+            <a:endParaRPr lang="en-US" sz="1600" dirty="0">
               <a:solidFill>
                 <a:srgbClr val="000000"/>
               </a:solidFill>
@@ -7097,7 +7030,7 @@
           </a:p>
           <a:p>
             <a:r>
-              <a:rPr lang="en-US" dirty="0">
+              <a:rPr lang="en-US" sz="1600" dirty="0">
                 <a:solidFill>
                   <a:srgbClr val="000000"/>
                 </a:solidFill>
@@ -7105,7 +7038,7 @@
               <a:t>    "subject"</a:t>
             </a:r>
             <a:r>
-              <a:rPr lang="en-US" dirty="0" smtClean="0">
+              <a:rPr lang="en-US" sz="1600" dirty="0" smtClean="0">
                 <a:solidFill>
                   <a:srgbClr val="000000"/>
                 </a:solidFill>
@@ -7113,7 +7046,7 @@
               <a:t>: </a:t>
             </a:r>
             <a:r>
-              <a:rPr lang="en-US" dirty="0" smtClean="0">
+              <a:rPr lang="en-US" sz="1600" dirty="0" smtClean="0">
                 <a:solidFill>
                   <a:srgbClr val="000000"/>
                 </a:solidFill>
@@ -7122,7 +7055,7 @@
               <a:t>“https</a:t>
             </a:r>
             <a:r>
-              <a:rPr lang="en-US" dirty="0">
+              <a:rPr lang="en-US" sz="1600" dirty="0">
                 <a:solidFill>
                   <a:srgbClr val="000000"/>
                 </a:solidFill>
@@ -7131,13 +7064,13 @@
               <a:t>://gmoc-</a:t>
             </a:r>
             <a:r>
-              <a:rPr lang="en-US" dirty="0" smtClean="0">
+              <a:rPr lang="en-US" sz="1600" dirty="0" smtClean="0">
                 <a:hlinkClick r:id="rId2"/>
               </a:rPr>
               <a:t>db.grnoc.iu.edu</a:t>
             </a:r>
             <a:r>
-              <a:rPr lang="en-US" dirty="0" smtClean="0">
+              <a:rPr lang="en-US" sz="1600" dirty="0" smtClean="0">
                 <a:solidFill>
                   <a:srgbClr val="000000"/>
                 </a:solidFill>
@@ -7146,7 +7079,7 @@
               <a:t>/</a:t>
             </a:r>
             <a:r>
-              <a:rPr lang="en-US" dirty="0">
+              <a:rPr lang="en-US" sz="1600" dirty="0">
                 <a:solidFill>
                   <a:srgbClr val="000000"/>
                 </a:solidFill>
@@ -7155,16 +7088,16 @@
               <a:t>info/interface</a:t>
             </a:r>
             <a:r>
-              <a:rPr lang="en-US" dirty="0" smtClean="0">
+              <a:rPr lang="en-US" sz="1600" dirty="0" smtClean="0">
                 <a:solidFill>
                   <a:srgbClr val="000000"/>
                 </a:solidFill>
                 <a:hlinkClick r:id="rId2"/>
               </a:rPr>
-              <a:t>/ion.internet2</a:t>
-            </a:r>
-            <a:r>
-              <a:rPr lang="en-US" dirty="0">
+              <a:t>/rtr.wash.ion.internet2</a:t>
+            </a:r>
+            <a:r>
+              <a:rPr lang="en-US" sz="1600" dirty="0">
                 <a:solidFill>
                   <a:srgbClr val="000000"/>
                 </a:solidFill>
@@ -7173,7 +7106,7 @@
               <a:t>.edu/xe-0/2/</a:t>
             </a:r>
             <a:r>
-              <a:rPr lang="en-US" dirty="0" smtClean="0">
+              <a:rPr lang="en-US" sz="1600" dirty="0" smtClean="0">
                 <a:solidFill>
                   <a:srgbClr val="000000"/>
                 </a:solidFill>
@@ -7182,22 +7115,17 @@
               <a:t>2</a:t>
             </a:r>
             <a:r>
-              <a:rPr lang="en-US" dirty="0" smtClean="0">
+              <a:rPr lang="en-US" sz="1600" dirty="0" smtClean="0">
                 <a:solidFill>
                   <a:srgbClr val="000000"/>
                 </a:solidFill>
               </a:rPr>
               <a:t>”</a:t>
             </a:r>
-            <a:endParaRPr lang="en-US" dirty="0" smtClean="0">
-              <a:solidFill>
-                <a:srgbClr val="000000"/>
-              </a:solidFill>
-            </a:endParaRPr>
-          </a:p>
-          <a:p>
-            <a:r>
-              <a:rPr lang="en-US" dirty="0" smtClean="0">
+          </a:p>
+          <a:p>
+            <a:r>
+              <a:rPr lang="en-US" sz="1600" dirty="0" smtClean="0">
                 <a:solidFill>
                   <a:srgbClr val="000000"/>
                 </a:solidFill>
@@ -7205,15 +7133,31 @@
               <a:t>    "</a:t>
             </a:r>
             <a:r>
-              <a:rPr lang="en-US" dirty="0">
-                <a:solidFill>
-                  <a:srgbClr val="000000"/>
-                </a:solidFill>
-              </a:rPr>
-              <a:t>id":"rx_bps:ion.internet2.edu+interface+rtr.wash.ion.internet2.edu:xe-0/2/2"</a:t>
-            </a:r>
-            <a:r>
-              <a:rPr lang="en-US" dirty="0" smtClean="0">
+              <a:rPr lang="en-US" sz="1600" dirty="0">
+                <a:solidFill>
+                  <a:srgbClr val="000000"/>
+                </a:solidFill>
+              </a:rPr>
+              <a:t>id":"</a:t>
+            </a:r>
+            <a:r>
+              <a:rPr lang="en-US" sz="1600" dirty="0" smtClean="0">
+                <a:solidFill>
+                  <a:srgbClr val="000000"/>
+                </a:solidFill>
+              </a:rPr>
+              <a:t>rx_bps:rtr.wash.ion.internet2</a:t>
+            </a:r>
+            <a:r>
+              <a:rPr lang="en-US" sz="1600" dirty="0">
+                <a:solidFill>
+                  <a:srgbClr val="000000"/>
+                </a:solidFill>
+              </a:rPr>
+              <a:t>.edu:xe-0/2/2"</a:t>
+            </a:r>
+            <a:r>
+              <a:rPr lang="en-US" sz="1600" dirty="0" smtClean="0">
                 <a:solidFill>
                   <a:srgbClr val="000000"/>
                 </a:solidFill>
@@ -7223,7 +7167,7 @@
           </a:p>
           <a:p>
             <a:r>
-              <a:rPr lang="en-US" dirty="0" smtClean="0">
+              <a:rPr lang="en-US" sz="1600" dirty="0" smtClean="0">
                 <a:solidFill>
                   <a:srgbClr val="000000"/>
                 </a:solidFill>
@@ -7231,7 +7175,7 @@
               <a:t>    "</a:t>
             </a:r>
             <a:r>
-              <a:rPr lang="en-US" dirty="0" err="1">
+              <a:rPr lang="en-US" sz="1600" dirty="0" err="1">
                 <a:solidFill>
                   <a:srgbClr val="000000"/>
                 </a:solidFill>
@@ -7239,7 +7183,7 @@
               <a:t>description":"bits</a:t>
             </a:r>
             <a:r>
-              <a:rPr lang="en-US" dirty="0">
+              <a:rPr lang="en-US" sz="1600" dirty="0">
                 <a:solidFill>
                   <a:srgbClr val="000000"/>
                 </a:solidFill>
@@ -7249,7 +7193,7 @@
           </a:p>
           <a:p>
             <a:r>
-              <a:rPr lang="en-US" dirty="0">
+              <a:rPr lang="en-US" sz="1600" dirty="0">
                 <a:solidFill>
                   <a:srgbClr val="000000"/>
                 </a:solidFill>
@@ -7257,7 +7201,7 @@
               <a:t>    "</a:t>
             </a:r>
             <a:r>
-              <a:rPr lang="en-US" dirty="0" err="1">
+              <a:rPr lang="en-US" sz="1600" dirty="0" err="1">
                 <a:solidFill>
                   <a:srgbClr val="000000"/>
                 </a:solidFill>
@@ -7265,7 +7209,7 @@
               <a:t>units":"float</a:t>
             </a:r>
             <a:r>
-              <a:rPr lang="en-US" dirty="0">
+              <a:rPr lang="en-US" sz="1600" dirty="0">
                 <a:solidFill>
                   <a:srgbClr val="000000"/>
                 </a:solidFill>
@@ -7275,7 +7219,7 @@
           </a:p>
           <a:p>
             <a:r>
-              <a:rPr lang="en-US" dirty="0">
+              <a:rPr lang="en-US" sz="1600" dirty="0">
                 <a:solidFill>
                   <a:srgbClr val="000000"/>
                 </a:solidFill>
@@ -7283,7 +7227,7 @@
               <a:t>    "$schema"</a:t>
             </a:r>
             <a:r>
-              <a:rPr lang="en-US" dirty="0" smtClean="0">
+              <a:rPr lang="en-US" sz="1600" dirty="0" smtClean="0">
                 <a:solidFill>
                   <a:srgbClr val="000000"/>
                 </a:solidFill>
@@ -7291,98 +7235,76 @@
               <a:t>: </a:t>
             </a:r>
             <a:r>
-              <a:rPr lang="en-US" dirty="0" smtClean="0">
+              <a:rPr lang="en-US" sz="1600" dirty="0" smtClean="0">
                 <a:solidFill>
                   <a:srgbClr val="000000"/>
                 </a:solidFill>
                 <a:hlinkClick r:id="rId3"/>
               </a:rPr>
-              <a:t>“http</a:t>
-            </a:r>
-            <a:r>
-              <a:rPr lang="en-US" dirty="0" smtClean="0">
+              <a:t>“http:</a:t>
+            </a:r>
+            <a:r>
+              <a:rPr lang="en-US" sz="1600" dirty="0">
                 <a:solidFill>
                   <a:srgbClr val="000000"/>
                 </a:solidFill>
                 <a:hlinkClick r:id="rId3"/>
               </a:rPr>
-              <a:t>:</a:t>
-            </a:r>
-            <a:r>
-              <a:rPr lang="en-US" dirty="0">
+              <a:t>//www.gpolab.bbn.com/monitoring/schema/20140828/data</a:t>
+            </a:r>
+            <a:r>
+              <a:rPr lang="en-US" sz="1600" dirty="0" smtClean="0">
                 <a:solidFill>
                   <a:srgbClr val="000000"/>
                 </a:solidFill>
                 <a:hlinkClick r:id="rId3"/>
               </a:rPr>
-              <a:t>//www.gpolab.bbn.com/monitoring/schema/20140828/data</a:t>
-            </a:r>
-            <a:r>
-              <a:rPr lang="en-US" dirty="0" smtClean="0">
-                <a:solidFill>
-                  <a:srgbClr val="000000"/>
-                </a:solidFill>
-                <a:hlinkClick r:id="rId3"/>
-              </a:rPr>
               <a:t>#</a:t>
             </a:r>
             <a:r>
-              <a:rPr lang="en-US" dirty="0" smtClean="0">
+              <a:rPr lang="en-US" sz="1600" dirty="0" smtClean="0">
                 <a:solidFill>
                   <a:srgbClr val="000000"/>
                 </a:solidFill>
               </a:rPr>
               <a:t>”</a:t>
             </a:r>
-            <a:endParaRPr lang="en-US" dirty="0" smtClean="0">
-              <a:solidFill>
-                <a:srgbClr val="000000"/>
-              </a:solidFill>
-            </a:endParaRPr>
-          </a:p>
-          <a:p>
-            <a:r>
-              <a:rPr lang="en-US" dirty="0" smtClean="0">
-                <a:solidFill>
-                  <a:srgbClr val="000000"/>
-                </a:solidFill>
-              </a:rPr>
-              <a:t>  }</a:t>
-            </a:r>
-            <a:r>
-              <a:rPr lang="en-US" dirty="0" smtClean="0">
-                <a:solidFill>
-                  <a:srgbClr val="000000"/>
-                </a:solidFill>
-              </a:rPr>
-              <a:t>,</a:t>
-            </a:r>
-          </a:p>
-          <a:p>
-            <a:r>
-              <a:rPr lang="en-US" dirty="0"/>
+          </a:p>
+          <a:p>
+            <a:r>
+              <a:rPr lang="en-US" sz="1600" dirty="0" smtClean="0">
+                <a:solidFill>
+                  <a:srgbClr val="000000"/>
+                </a:solidFill>
+              </a:rPr>
+              <a:t>  },</a:t>
+            </a:r>
+          </a:p>
+          <a:p>
+            <a:r>
+              <a:rPr lang="en-US" sz="1600" dirty="0"/>
               <a:t> </a:t>
             </a:r>
             <a:r>
-              <a:rPr lang="en-US" dirty="0" smtClean="0"/>
+              <a:rPr lang="en-US" sz="1600" dirty="0" smtClean="0"/>
               <a:t> {“</a:t>
             </a:r>
             <a:r>
-              <a:rPr lang="en-US" dirty="0" err="1" smtClean="0"/>
+              <a:rPr lang="en-US" sz="1600" dirty="0" err="1" smtClean="0"/>
               <a:t>tsdata</a:t>
             </a:r>
             <a:r>
-              <a:rPr lang="en-US" dirty="0" smtClean="0"/>
+              <a:rPr lang="en-US" sz="1600" dirty="0" smtClean="0"/>
               <a:t>”:[….] }</a:t>
             </a:r>
-            <a:endParaRPr lang="en-US" dirty="0"/>
-          </a:p>
-          <a:p>
-            <a:r>
-              <a:rPr lang="en-US" dirty="0" smtClean="0"/>
+            <a:endParaRPr lang="en-US" sz="1600" dirty="0"/>
+          </a:p>
+          <a:p>
+            <a:r>
+              <a:rPr lang="en-US" sz="1600" dirty="0" smtClean="0"/>
               <a:t>]</a:t>
             </a:r>
-            <a:endParaRPr lang="en-US" dirty="0"/>
+            <a:endParaRPr lang="en-US" sz="1600" dirty="0"/>
           </a:p>
         </p:txBody>
       </p:sp>
@@ -7463,11 +7385,7 @@
           <a:p>
             <a:r>
               <a:rPr lang="en-US" dirty="0" smtClean="0"/>
-              <a:t>JSON data response: top-leve</a:t>
-            </a:r>
-            <a:r>
-              <a:rPr lang="en-US" dirty="0" smtClean="0"/>
-              <a:t>l list</a:t>
+              <a:t>JSON data response: top-level list</a:t>
             </a:r>
             <a:endParaRPr lang="en-US" dirty="0"/>
           </a:p>
@@ -7482,7 +7400,7 @@
         <p:spPr>
           <a:xfrm>
             <a:off x="445218" y="1219200"/>
-            <a:ext cx="6779282" cy="3231654"/>
+            <a:ext cx="7514497" cy="3262432"/>
           </a:xfrm>
           <a:prstGeom prst="rect">
             <a:avLst/>
@@ -7552,15 +7470,7 @@
                   <a:srgbClr val="000000"/>
                 </a:solidFill>
               </a:rPr>
-              <a:t> </a:t>
-            </a:r>
-            <a:r>
-              <a:rPr lang="en-US" sz="1400" dirty="0" smtClean="0">
-                <a:solidFill>
-                  <a:srgbClr val="000000"/>
-                </a:solidFill>
-              </a:rPr>
-              <a:t>{</a:t>
+              <a:t> {</a:t>
             </a:r>
             <a:r>
               <a:rPr lang="en-US" sz="1400" dirty="0">
@@ -7743,7 +7653,7 @@
                 </a:solidFill>
                 <a:hlinkClick r:id="rId2"/>
               </a:rPr>
-              <a:t>/ion.internet2</a:t>
+              <a:t>/</a:t>
             </a:r>
             <a:r>
               <a:rPr lang="en-US" sz="1400" dirty="0">
@@ -7752,6 +7662,24 @@
                 </a:solidFill>
                 <a:hlinkClick r:id="rId2"/>
               </a:rPr>
+              <a:t>rtr.wash.</a:t>
+            </a:r>
+            <a:r>
+              <a:rPr lang="en-US" sz="1400" dirty="0" smtClean="0">
+                <a:solidFill>
+                  <a:srgbClr val="000000"/>
+                </a:solidFill>
+                <a:hlinkClick r:id="rId2"/>
+              </a:rPr>
+              <a:t>ion.internet2</a:t>
+            </a:r>
+            <a:r>
+              <a:rPr lang="en-US" sz="1400" dirty="0">
+                <a:solidFill>
+                  <a:srgbClr val="000000"/>
+                </a:solidFill>
+                <a:hlinkClick r:id="rId2"/>
+              </a:rPr>
               <a:t>.edu/xe-0/2/</a:t>
             </a:r>
             <a:r>
@@ -7771,11 +7699,6 @@
               </a:rPr>
               <a:t>”</a:t>
             </a:r>
-            <a:endParaRPr lang="en-US" sz="1400" dirty="0" smtClean="0">
-              <a:solidFill>
-                <a:srgbClr val="000000"/>
-              </a:solidFill>
-            </a:endParaRPr>
           </a:p>
           <a:p>
             <a:r>
@@ -7792,7 +7715,23 @@
                   <a:srgbClr val="000000"/>
                 </a:solidFill>
               </a:rPr>
-              <a:t>id":"rx_bps:ion.internet2.edu+interface+rtr.wash.ion.internet2.edu:xe-0/2/2"</a:t>
+              <a:t>id":"</a:t>
+            </a:r>
+            <a:r>
+              <a:rPr lang="en-US" sz="1400" dirty="0" smtClean="0">
+                <a:solidFill>
+                  <a:srgbClr val="000000"/>
+                </a:solidFill>
+              </a:rPr>
+              <a:t>rx_bps:rtr.wash.ion.internet2</a:t>
+            </a:r>
+            <a:r>
+              <a:rPr lang="en-US" sz="1400" dirty="0">
+                <a:solidFill>
+                  <a:srgbClr val="000000"/>
+                </a:solidFill>
+              </a:rPr>
+              <a:t>.edu:xe-0/2/2"</a:t>
             </a:r>
             <a:r>
               <a:rPr lang="en-US" sz="1400" dirty="0" smtClean="0">
@@ -7879,33 +7818,24 @@
                 </a:solidFill>
                 <a:hlinkClick r:id="rId3"/>
               </a:rPr>
-              <a:t>“http</a:t>
-            </a:r>
-            <a:r>
-              <a:rPr lang="en-US" sz="1400" dirty="0" smtClean="0">
+              <a:t>“http:</a:t>
+            </a:r>
+            <a:r>
+              <a:rPr lang="en-US" sz="1400" dirty="0">
                 <a:solidFill>
                   <a:srgbClr val="000000"/>
                 </a:solidFill>
                 <a:hlinkClick r:id="rId3"/>
               </a:rPr>
-              <a:t>:</a:t>
-            </a:r>
-            <a:r>
-              <a:rPr lang="en-US" sz="1400" dirty="0">
+              <a:t>//www.gpolab.bbn.com/monitoring/schema/20140828/data</a:t>
+            </a:r>
+            <a:r>
+              <a:rPr lang="en-US" sz="1400" dirty="0" smtClean="0">
                 <a:solidFill>
                   <a:srgbClr val="000000"/>
                 </a:solidFill>
                 <a:hlinkClick r:id="rId3"/>
               </a:rPr>
-              <a:t>//www.gpolab.bbn.com/monitoring/schema/20140828/data</a:t>
-            </a:r>
-            <a:r>
-              <a:rPr lang="en-US" sz="1400" dirty="0" smtClean="0">
-                <a:solidFill>
-                  <a:srgbClr val="000000"/>
-                </a:solidFill>
-                <a:hlinkClick r:id="rId3"/>
-              </a:rPr>
               <a:t>#</a:t>
             </a:r>
             <a:r>
@@ -7916,28 +7846,15 @@
               </a:rPr>
               <a:t>”</a:t>
             </a:r>
-            <a:endParaRPr lang="en-US" sz="1400" dirty="0" smtClean="0">
-              <a:solidFill>
-                <a:srgbClr val="000000"/>
-              </a:solidFill>
-            </a:endParaRPr>
-          </a:p>
-          <a:p>
-            <a:r>
-              <a:rPr lang="en-US" sz="1400" dirty="0" smtClean="0">
-                <a:solidFill>
-                  <a:srgbClr val="000000"/>
-                </a:solidFill>
-              </a:rPr>
-              <a:t>  }</a:t>
-            </a:r>
-            <a:r>
-              <a:rPr lang="en-US" sz="1400" dirty="0" smtClean="0">
-                <a:solidFill>
-                  <a:srgbClr val="000000"/>
-                </a:solidFill>
-              </a:rPr>
-              <a:t>,</a:t>
+          </a:p>
+          <a:p>
+            <a:r>
+              <a:rPr lang="en-US" sz="1400" dirty="0" smtClean="0">
+                <a:solidFill>
+                  <a:srgbClr val="000000"/>
+                </a:solidFill>
+              </a:rPr>
+              <a:t>  },</a:t>
             </a:r>
           </a:p>
           <a:p>
@@ -8045,11 +7962,7 @@
           <a:p>
             <a:r>
               <a:rPr lang="en-US" dirty="0" smtClean="0"/>
-              <a:t>JSON data response: top-leve</a:t>
-            </a:r>
-            <a:r>
-              <a:rPr lang="en-US" dirty="0" smtClean="0"/>
-              <a:t>l list FIX</a:t>
+              <a:t>JSON data response: top-level list FIX</a:t>
             </a:r>
             <a:endParaRPr lang="en-US" dirty="0"/>
           </a:p>
@@ -8064,7 +7977,7 @@
         <p:spPr>
           <a:xfrm>
             <a:off x="445218" y="1219200"/>
-            <a:ext cx="6838906" cy="3939540"/>
+            <a:ext cx="7614259" cy="3970318"/>
           </a:xfrm>
           <a:prstGeom prst="rect">
             <a:avLst/>
@@ -8183,7 +8096,6 @@
               <a:rPr lang="en-US" sz="1400" dirty="0" smtClean="0"/>
               <a:t>”: [</a:t>
             </a:r>
-            <a:endParaRPr lang="en-US" sz="1400" dirty="0" smtClean="0"/>
           </a:p>
           <a:p>
             <a:r>
@@ -8200,15 +8112,7 @@
                   <a:srgbClr val="000000"/>
                 </a:solidFill>
               </a:rPr>
-              <a:t>   </a:t>
-            </a:r>
-            <a:r>
-              <a:rPr lang="en-US" sz="1400" dirty="0" smtClean="0">
-                <a:solidFill>
-                  <a:srgbClr val="000000"/>
-                </a:solidFill>
-              </a:rPr>
-              <a:t>{</a:t>
+              <a:t>   {</a:t>
             </a:r>
           </a:p>
           <a:p>
@@ -8226,15 +8130,7 @@
                   <a:srgbClr val="000000"/>
                 </a:solidFill>
               </a:rPr>
-              <a:t>     </a:t>
-            </a:r>
-            <a:r>
-              <a:rPr lang="en-US" sz="1400" dirty="0" smtClean="0">
-                <a:solidFill>
-                  <a:srgbClr val="000000"/>
-                </a:solidFill>
-              </a:rPr>
-              <a:t>"</a:t>
+              <a:t>     "</a:t>
             </a:r>
             <a:r>
               <a:rPr lang="en-US" sz="1400" dirty="0" err="1">
@@ -8433,7 +8329,7 @@
                 </a:solidFill>
                 <a:hlinkClick r:id="rId3"/>
               </a:rPr>
-              <a:t>/ion.internet2</a:t>
+              <a:t>/</a:t>
             </a:r>
             <a:r>
               <a:rPr lang="en-US" sz="1400" dirty="0">
@@ -8442,6 +8338,24 @@
                 </a:solidFill>
                 <a:hlinkClick r:id="rId3"/>
               </a:rPr>
+              <a:t>rtr.wash.</a:t>
+            </a:r>
+            <a:r>
+              <a:rPr lang="en-US" sz="1400" dirty="0" smtClean="0">
+                <a:solidFill>
+                  <a:srgbClr val="000000"/>
+                </a:solidFill>
+                <a:hlinkClick r:id="rId3"/>
+              </a:rPr>
+              <a:t>ion.internet2</a:t>
+            </a:r>
+            <a:r>
+              <a:rPr lang="en-US" sz="1400" dirty="0">
+                <a:solidFill>
+                  <a:srgbClr val="000000"/>
+                </a:solidFill>
+                <a:hlinkClick r:id="rId3"/>
+              </a:rPr>
               <a:t>.edu/xe-0/2/</a:t>
             </a:r>
             <a:r>
@@ -8461,11 +8375,6 @@
               </a:rPr>
               <a:t>”</a:t>
             </a:r>
-            <a:endParaRPr lang="en-US" sz="1400" dirty="0" smtClean="0">
-              <a:solidFill>
-                <a:srgbClr val="000000"/>
-              </a:solidFill>
-            </a:endParaRPr>
           </a:p>
           <a:p>
             <a:r>
@@ -8482,7 +8391,23 @@
                   <a:srgbClr val="000000"/>
                 </a:solidFill>
               </a:rPr>
-              <a:t>id":"rx_bps:ion.internet2.edu+interface+rtr.wash.ion.internet2.edu:xe-0/2/2"</a:t>
+              <a:t>id":"</a:t>
+            </a:r>
+            <a:r>
+              <a:rPr lang="en-US" sz="1400" dirty="0" smtClean="0">
+                <a:solidFill>
+                  <a:srgbClr val="000000"/>
+                </a:solidFill>
+              </a:rPr>
+              <a:t>rx_bps:rtr.wash.ion.internet2</a:t>
+            </a:r>
+            <a:r>
+              <a:rPr lang="en-US" sz="1400" dirty="0">
+                <a:solidFill>
+                  <a:srgbClr val="000000"/>
+                </a:solidFill>
+              </a:rPr>
+              <a:t>.edu:xe-0/2/2"</a:t>
             </a:r>
             <a:r>
               <a:rPr lang="en-US" sz="1400" dirty="0" smtClean="0">
@@ -8576,23 +8501,7 @@
                   <a:srgbClr val="000000"/>
                 </a:solidFill>
               </a:rPr>
-              <a:t>   </a:t>
-            </a:r>
-            <a:r>
-              <a:rPr lang="en-US" sz="1400" dirty="0" smtClean="0">
-                <a:solidFill>
-                  <a:srgbClr val="000000"/>
-                </a:solidFill>
-              </a:rPr>
-              <a:t>}</a:t>
-            </a:r>
-            <a:r>
-              <a:rPr lang="en-US" sz="1400" dirty="0" smtClean="0">
-                <a:solidFill>
-                  <a:srgbClr val="000000"/>
-                </a:solidFill>
-              </a:rPr>
-              <a:t>,</a:t>
+              <a:t>   },</a:t>
             </a:r>
           </a:p>
           <a:p>
@@ -8602,11 +8511,7 @@
             </a:r>
             <a:r>
               <a:rPr lang="en-US" sz="1400" dirty="0" smtClean="0"/>
-              <a:t>   </a:t>
-            </a:r>
-            <a:r>
-              <a:rPr lang="en-US" sz="1400" dirty="0" smtClean="0"/>
-              <a:t>{“</a:t>
+              <a:t>   {“</a:t>
             </a:r>
             <a:r>
               <a:rPr lang="en-US" sz="1400" dirty="0" err="1" smtClean="0"/>
@@ -8751,7 +8656,7 @@
         <p:spPr>
           <a:xfrm>
             <a:off x="445218" y="1219200"/>
-            <a:ext cx="6739144" cy="3108544"/>
+            <a:ext cx="7514497" cy="3139321"/>
           </a:xfrm>
           <a:prstGeom prst="rect">
             <a:avLst/>
@@ -8780,15 +8685,7 @@
                   <a:srgbClr val="000000"/>
                 </a:solidFill>
               </a:rPr>
-              <a:t> </a:t>
-            </a:r>
-            <a:r>
-              <a:rPr lang="en-US" sz="1400" dirty="0" smtClean="0">
-                <a:solidFill>
-                  <a:srgbClr val="000000"/>
-                </a:solidFill>
-              </a:rPr>
-              <a:t>{</a:t>
+              <a:t> {</a:t>
             </a:r>
             <a:r>
               <a:rPr lang="en-US" sz="1400" dirty="0">
@@ -9019,7 +8916,7 @@
                 </a:solidFill>
                 <a:hlinkClick r:id="rId2"/>
               </a:rPr>
-              <a:t>/ion.internet2</a:t>
+              <a:t>/</a:t>
             </a:r>
             <a:r>
               <a:rPr lang="en-US" sz="1400" dirty="0">
@@ -9028,6 +8925,24 @@
                 </a:solidFill>
                 <a:hlinkClick r:id="rId2"/>
               </a:rPr>
+              <a:t>rtr.wash.</a:t>
+            </a:r>
+            <a:r>
+              <a:rPr lang="en-US" sz="1400" dirty="0" smtClean="0">
+                <a:solidFill>
+                  <a:srgbClr val="000000"/>
+                </a:solidFill>
+                <a:hlinkClick r:id="rId2"/>
+              </a:rPr>
+              <a:t>ion.internet2</a:t>
+            </a:r>
+            <a:r>
+              <a:rPr lang="en-US" sz="1400" dirty="0">
+                <a:solidFill>
+                  <a:srgbClr val="000000"/>
+                </a:solidFill>
+                <a:hlinkClick r:id="rId2"/>
+              </a:rPr>
               <a:t>.edu/xe-0/2/</a:t>
             </a:r>
             <a:r>
@@ -9047,11 +8962,6 @@
               </a:rPr>
               <a:t>”</a:t>
             </a:r>
-            <a:endParaRPr lang="en-US" sz="1400" dirty="0" smtClean="0">
-              <a:solidFill>
-                <a:srgbClr val="000000"/>
-              </a:solidFill>
-            </a:endParaRPr>
           </a:p>
           <a:p>
             <a:r>
@@ -9068,7 +8978,23 @@
                   <a:srgbClr val="000000"/>
                 </a:solidFill>
               </a:rPr>
-              <a:t>id":"rx_bps:ion.internet2.edu+interface+rtr.wash.ion.internet2.edu:xe-0/2/2"</a:t>
+              <a:t>id":"</a:t>
+            </a:r>
+            <a:r>
+              <a:rPr lang="en-US" sz="1400" dirty="0" smtClean="0">
+                <a:solidFill>
+                  <a:srgbClr val="000000"/>
+                </a:solidFill>
+              </a:rPr>
+              <a:t>rx_bps:rtr.wash.ion.internet2</a:t>
+            </a:r>
+            <a:r>
+              <a:rPr lang="en-US" sz="1400" dirty="0">
+                <a:solidFill>
+                  <a:srgbClr val="000000"/>
+                </a:solidFill>
+              </a:rPr>
+              <a:t>.edu:xe-0/2/2"</a:t>
             </a:r>
             <a:r>
               <a:rPr lang="en-US" sz="1400" dirty="0" smtClean="0">
@@ -9155,33 +9081,24 @@
                 </a:solidFill>
                 <a:hlinkClick r:id="rId3"/>
               </a:rPr>
-              <a:t>“http</a:t>
-            </a:r>
-            <a:r>
-              <a:rPr lang="en-US" sz="1400" dirty="0" smtClean="0">
+              <a:t>“http:</a:t>
+            </a:r>
+            <a:r>
+              <a:rPr lang="en-US" sz="1400" dirty="0">
                 <a:solidFill>
                   <a:srgbClr val="000000"/>
                 </a:solidFill>
                 <a:hlinkClick r:id="rId3"/>
               </a:rPr>
-              <a:t>:</a:t>
-            </a:r>
-            <a:r>
-              <a:rPr lang="en-US" sz="1400" dirty="0">
+              <a:t>//www.gpolab.bbn.com/monitoring/schema/20140828/data</a:t>
+            </a:r>
+            <a:r>
+              <a:rPr lang="en-US" sz="1400" dirty="0" smtClean="0">
                 <a:solidFill>
                   <a:srgbClr val="000000"/>
                 </a:solidFill>
                 <a:hlinkClick r:id="rId3"/>
               </a:rPr>
-              <a:t>//www.gpolab.bbn.com/monitoring/schema/20140828/data</a:t>
-            </a:r>
-            <a:r>
-              <a:rPr lang="en-US" sz="1400" dirty="0" smtClean="0">
-                <a:solidFill>
-                  <a:srgbClr val="000000"/>
-                </a:solidFill>
-                <a:hlinkClick r:id="rId3"/>
-              </a:rPr>
               <a:t>#</a:t>
             </a:r>
             <a:r>
@@ -9192,28 +9109,15 @@
               </a:rPr>
               <a:t>”</a:t>
             </a:r>
-            <a:endParaRPr lang="en-US" sz="1400" dirty="0" smtClean="0">
-              <a:solidFill>
-                <a:srgbClr val="000000"/>
-              </a:solidFill>
-            </a:endParaRPr>
-          </a:p>
-          <a:p>
-            <a:r>
-              <a:rPr lang="en-US" sz="1400" dirty="0" smtClean="0">
-                <a:solidFill>
-                  <a:srgbClr val="000000"/>
-                </a:solidFill>
-              </a:rPr>
-              <a:t>  }</a:t>
-            </a:r>
-            <a:r>
-              <a:rPr lang="en-US" sz="1400" dirty="0" smtClean="0">
-                <a:solidFill>
-                  <a:srgbClr val="000000"/>
-                </a:solidFill>
-              </a:rPr>
-              <a:t>,</a:t>
+          </a:p>
+          <a:p>
+            <a:r>
+              <a:rPr lang="en-US" sz="1400" dirty="0" smtClean="0">
+                <a:solidFill>
+                  <a:srgbClr val="000000"/>
+                </a:solidFill>
+              </a:rPr>
+              <a:t>  },</a:t>
             </a:r>
           </a:p>
           <a:p>
@@ -9400,7 +9304,7 @@
         <p:spPr>
           <a:xfrm>
             <a:off x="445218" y="1219200"/>
-            <a:ext cx="6739144" cy="3108544"/>
+            <a:ext cx="7514497" cy="3139321"/>
           </a:xfrm>
           <a:prstGeom prst="rect">
             <a:avLst/>
@@ -9429,15 +9333,7 @@
                   <a:srgbClr val="000000"/>
                 </a:solidFill>
               </a:rPr>
-              <a:t> </a:t>
-            </a:r>
-            <a:r>
-              <a:rPr lang="en-US" sz="1400" dirty="0" smtClean="0">
-                <a:solidFill>
-                  <a:srgbClr val="000000"/>
-                </a:solidFill>
-              </a:rPr>
-              <a:t>{</a:t>
+              <a:t> {</a:t>
             </a:r>
             <a:r>
               <a:rPr lang="en-US" sz="1400" dirty="0">
@@ -9624,7 +9520,7 @@
                 </a:solidFill>
                 <a:hlinkClick r:id="rId2"/>
               </a:rPr>
-              <a:t>/ion.internet2</a:t>
+              <a:t>/</a:t>
             </a:r>
             <a:r>
               <a:rPr lang="en-US" sz="1400" dirty="0">
@@ -9633,6 +9529,24 @@
                 </a:solidFill>
                 <a:hlinkClick r:id="rId2"/>
               </a:rPr>
+              <a:t>rtr.wash.</a:t>
+            </a:r>
+            <a:r>
+              <a:rPr lang="en-US" sz="1400" dirty="0" smtClean="0">
+                <a:solidFill>
+                  <a:srgbClr val="000000"/>
+                </a:solidFill>
+                <a:hlinkClick r:id="rId2"/>
+              </a:rPr>
+              <a:t>ion.internet2</a:t>
+            </a:r>
+            <a:r>
+              <a:rPr lang="en-US" sz="1400" dirty="0">
+                <a:solidFill>
+                  <a:srgbClr val="000000"/>
+                </a:solidFill>
+                <a:hlinkClick r:id="rId2"/>
+              </a:rPr>
               <a:t>.edu/xe-0/2/</a:t>
             </a:r>
             <a:r>
@@ -9652,11 +9566,6 @@
               </a:rPr>
               <a:t>”</a:t>
             </a:r>
-            <a:endParaRPr lang="en-US" sz="1400" dirty="0" smtClean="0">
-              <a:solidFill>
-                <a:srgbClr val="000000"/>
-              </a:solidFill>
-            </a:endParaRPr>
           </a:p>
           <a:p>
             <a:r>
@@ -9673,7 +9582,23 @@
                   <a:srgbClr val="000000"/>
                 </a:solidFill>
               </a:rPr>
-              <a:t>id":"rx_bps:ion.internet2.edu+interface+rtr.wash.ion.internet2.edu:xe-0/2/2"</a:t>
+              <a:t>id":"</a:t>
+            </a:r>
+            <a:r>
+              <a:rPr lang="en-US" sz="1400" dirty="0" smtClean="0">
+                <a:solidFill>
+                  <a:srgbClr val="000000"/>
+                </a:solidFill>
+              </a:rPr>
+              <a:t>rx_bps:rtr.wash.ion.internet2</a:t>
+            </a:r>
+            <a:r>
+              <a:rPr lang="en-US" sz="1400" dirty="0">
+                <a:solidFill>
+                  <a:srgbClr val="000000"/>
+                </a:solidFill>
+              </a:rPr>
+              <a:t>.edu:xe-0/2/2"</a:t>
             </a:r>
             <a:r>
               <a:rPr lang="en-US" sz="1400" dirty="0" smtClean="0">
@@ -9760,33 +9685,24 @@
                 </a:solidFill>
                 <a:hlinkClick r:id="rId3"/>
               </a:rPr>
-              <a:t>“http</a:t>
-            </a:r>
-            <a:r>
-              <a:rPr lang="en-US" sz="1400" dirty="0" smtClean="0">
+              <a:t>“http:</a:t>
+            </a:r>
+            <a:r>
+              <a:rPr lang="en-US" sz="1400" dirty="0">
                 <a:solidFill>
                   <a:srgbClr val="000000"/>
                 </a:solidFill>
                 <a:hlinkClick r:id="rId3"/>
               </a:rPr>
-              <a:t>:</a:t>
-            </a:r>
-            <a:r>
-              <a:rPr lang="en-US" sz="1400" dirty="0">
+              <a:t>//www.gpolab.bbn.com/monitoring/schema/20140828/data</a:t>
+            </a:r>
+            <a:r>
+              <a:rPr lang="en-US" sz="1400" dirty="0" smtClean="0">
                 <a:solidFill>
                   <a:srgbClr val="000000"/>
                 </a:solidFill>
                 <a:hlinkClick r:id="rId3"/>
               </a:rPr>
-              <a:t>//www.gpolab.bbn.com/monitoring/schema/20140828/data</a:t>
-            </a:r>
-            <a:r>
-              <a:rPr lang="en-US" sz="1400" dirty="0" smtClean="0">
-                <a:solidFill>
-                  <a:srgbClr val="000000"/>
-                </a:solidFill>
-                <a:hlinkClick r:id="rId3"/>
-              </a:rPr>
               <a:t>#</a:t>
             </a:r>
             <a:r>
@@ -9797,28 +9713,15 @@
               </a:rPr>
               <a:t>”</a:t>
             </a:r>
-            <a:endParaRPr lang="en-US" sz="1400" dirty="0" smtClean="0">
-              <a:solidFill>
-                <a:srgbClr val="000000"/>
-              </a:solidFill>
-            </a:endParaRPr>
-          </a:p>
-          <a:p>
-            <a:r>
-              <a:rPr lang="en-US" sz="1400" dirty="0" smtClean="0">
-                <a:solidFill>
-                  <a:srgbClr val="000000"/>
-                </a:solidFill>
-              </a:rPr>
-              <a:t>  }</a:t>
-            </a:r>
-            <a:r>
-              <a:rPr lang="en-US" sz="1400" dirty="0" smtClean="0">
-                <a:solidFill>
-                  <a:srgbClr val="000000"/>
-                </a:solidFill>
-              </a:rPr>
-              <a:t>,</a:t>
+          </a:p>
+          <a:p>
+            <a:r>
+              <a:rPr lang="en-US" sz="1400" dirty="0" smtClean="0">
+                <a:solidFill>
+                  <a:srgbClr val="000000"/>
+                </a:solidFill>
+              </a:rPr>
+              <a:t>  },</a:t>
             </a:r>
           </a:p>
           <a:p>
@@ -9991,7 +9894,7 @@
         <p:spPr>
           <a:xfrm>
             <a:off x="445218" y="1219200"/>
-            <a:ext cx="6739144" cy="3108544"/>
+            <a:ext cx="7514497" cy="3139321"/>
           </a:xfrm>
           <a:prstGeom prst="rect">
             <a:avLst/>
@@ -10020,15 +9923,7 @@
                   <a:srgbClr val="000000"/>
                 </a:solidFill>
               </a:rPr>
-              <a:t> </a:t>
-            </a:r>
-            <a:r>
-              <a:rPr lang="en-US" sz="1400" dirty="0" smtClean="0">
-                <a:solidFill>
-                  <a:srgbClr val="000000"/>
-                </a:solidFill>
-              </a:rPr>
-              <a:t>{</a:t>
+              <a:t> {</a:t>
             </a:r>
             <a:r>
               <a:rPr lang="en-US" sz="1400" dirty="0">
@@ -10231,7 +10126,7 @@
                 </a:solidFill>
                 <a:hlinkClick r:id="rId2"/>
               </a:rPr>
-              <a:t>/ion.internet2</a:t>
+              <a:t>/</a:t>
             </a:r>
             <a:r>
               <a:rPr lang="en-US" sz="1400" dirty="0">
@@ -10240,6 +10135,24 @@
                 </a:solidFill>
                 <a:hlinkClick r:id="rId2"/>
               </a:rPr>
+              <a:t>rtr.wash.</a:t>
+            </a:r>
+            <a:r>
+              <a:rPr lang="en-US" sz="1400" dirty="0" smtClean="0">
+                <a:solidFill>
+                  <a:srgbClr val="000000"/>
+                </a:solidFill>
+                <a:hlinkClick r:id="rId2"/>
+              </a:rPr>
+              <a:t>ion.internet2</a:t>
+            </a:r>
+            <a:r>
+              <a:rPr lang="en-US" sz="1400" dirty="0">
+                <a:solidFill>
+                  <a:srgbClr val="000000"/>
+                </a:solidFill>
+                <a:hlinkClick r:id="rId2"/>
+              </a:rPr>
               <a:t>.edu/xe-0/2/</a:t>
             </a:r>
             <a:r>
@@ -10259,11 +10172,6 @@
               </a:rPr>
               <a:t>”</a:t>
             </a:r>
-            <a:endParaRPr lang="en-US" sz="1400" dirty="0" smtClean="0">
-              <a:solidFill>
-                <a:srgbClr val="000000"/>
-              </a:solidFill>
-            </a:endParaRPr>
           </a:p>
           <a:p>
             <a:r>
@@ -10280,7 +10188,23 @@
                   <a:srgbClr val="000000"/>
                 </a:solidFill>
               </a:rPr>
-              <a:t>id":"rx_bps:ion.internet2.edu+interface+rtr.wash.ion.internet2.edu:xe-0/2/2"</a:t>
+              <a:t>id":"</a:t>
+            </a:r>
+            <a:r>
+              <a:rPr lang="en-US" sz="1400" dirty="0" smtClean="0">
+                <a:solidFill>
+                  <a:srgbClr val="000000"/>
+                </a:solidFill>
+              </a:rPr>
+              <a:t>rx_bps:rtr.wash.ion.internet2</a:t>
+            </a:r>
+            <a:r>
+              <a:rPr lang="en-US" sz="1400" dirty="0">
+                <a:solidFill>
+                  <a:srgbClr val="000000"/>
+                </a:solidFill>
+              </a:rPr>
+              <a:t>.edu:xe-0/2/2"</a:t>
             </a:r>
             <a:r>
               <a:rPr lang="en-US" sz="1400" dirty="0" smtClean="0">
@@ -10367,33 +10291,24 @@
                 </a:solidFill>
                 <a:hlinkClick r:id="rId3"/>
               </a:rPr>
-              <a:t>“http</a:t>
-            </a:r>
-            <a:r>
-              <a:rPr lang="en-US" sz="1400" dirty="0" smtClean="0">
+              <a:t>“http:</a:t>
+            </a:r>
+            <a:r>
+              <a:rPr lang="en-US" sz="1400" dirty="0">
                 <a:solidFill>
                   <a:srgbClr val="000000"/>
                 </a:solidFill>
                 <a:hlinkClick r:id="rId3"/>
               </a:rPr>
-              <a:t>:</a:t>
-            </a:r>
-            <a:r>
-              <a:rPr lang="en-US" sz="1400" dirty="0">
+              <a:t>//www.gpolab.bbn.com/monitoring/schema/20140828/data</a:t>
+            </a:r>
+            <a:r>
+              <a:rPr lang="en-US" sz="1400" dirty="0" smtClean="0">
                 <a:solidFill>
                   <a:srgbClr val="000000"/>
                 </a:solidFill>
                 <a:hlinkClick r:id="rId3"/>
               </a:rPr>
-              <a:t>//www.gpolab.bbn.com/monitoring/schema/20140828/data</a:t>
-            </a:r>
-            <a:r>
-              <a:rPr lang="en-US" sz="1400" dirty="0" smtClean="0">
-                <a:solidFill>
-                  <a:srgbClr val="000000"/>
-                </a:solidFill>
-                <a:hlinkClick r:id="rId3"/>
-              </a:rPr>
               <a:t>#</a:t>
             </a:r>
             <a:r>
@@ -10404,28 +10319,15 @@
               </a:rPr>
               <a:t>”</a:t>
             </a:r>
-            <a:endParaRPr lang="en-US" sz="1400" dirty="0" smtClean="0">
-              <a:solidFill>
-                <a:srgbClr val="000000"/>
-              </a:solidFill>
-            </a:endParaRPr>
-          </a:p>
-          <a:p>
-            <a:r>
-              <a:rPr lang="en-US" sz="1400" dirty="0" smtClean="0">
-                <a:solidFill>
-                  <a:srgbClr val="000000"/>
-                </a:solidFill>
-              </a:rPr>
-              <a:t>  }</a:t>
-            </a:r>
-            <a:r>
-              <a:rPr lang="en-US" sz="1400" dirty="0" smtClean="0">
-                <a:solidFill>
-                  <a:srgbClr val="000000"/>
-                </a:solidFill>
-              </a:rPr>
-              <a:t>,</a:t>
+          </a:p>
+          <a:p>
+            <a:r>
+              <a:rPr lang="en-US" sz="1400" dirty="0" smtClean="0">
+                <a:solidFill>
+                  <a:srgbClr val="000000"/>
+                </a:solidFill>
+              </a:rPr>
+              <a:t>  },</a:t>
             </a:r>
           </a:p>
           <a:p>

</xml_diff>